<commit_message>
updated the first assinment's slide
</commit_message>
<xml_diff>
--- a/Task 1/Slides Task 1.pptx
+++ b/Task 1/Slides Task 1.pptx
@@ -922,7 +922,7 @@
       </p:grpSpPr>
       <p:sp>
         <p:nvSpPr>
-          <p:cNvPr id="68" name="Google Shape;68;g29d7589ea21_0_26:notes"/>
+          <p:cNvPr id="68" name="Google Shape;68;g29df810d319_0_9:notes"/>
           <p:cNvSpPr/>
           <p:nvPr>
             <p:ph idx="2" type="sldImg"/>
@@ -957,7 +957,7 @@
       </p:sp>
       <p:sp>
         <p:nvSpPr>
-          <p:cNvPr id="69" name="Google Shape;69;g29d7589ea21_0_26:notes"/>
+          <p:cNvPr id="69" name="Google Shape;69;g29df810d319_0_9:notes"/>
           <p:cNvSpPr txBox="1"/>
           <p:nvPr>
             <p:ph idx="1" type="body"/>
@@ -1021,7 +1021,7 @@
       </p:grpSpPr>
       <p:sp>
         <p:nvSpPr>
-          <p:cNvPr id="74" name="Google Shape;74;g29345860dc9_1_180:notes"/>
+          <p:cNvPr id="74" name="Google Shape;74;g29d7589ea21_0_26:notes"/>
           <p:cNvSpPr/>
           <p:nvPr>
             <p:ph idx="2" type="sldImg"/>
@@ -1056,7 +1056,7 @@
       </p:sp>
       <p:sp>
         <p:nvSpPr>
-          <p:cNvPr id="75" name="Google Shape;75;g29345860dc9_1_180:notes"/>
+          <p:cNvPr id="75" name="Google Shape;75;g29d7589ea21_0_26:notes"/>
           <p:cNvSpPr txBox="1"/>
           <p:nvPr>
             <p:ph idx="1" type="body"/>
@@ -1120,7 +1120,7 @@
       </p:grpSpPr>
       <p:sp>
         <p:nvSpPr>
-          <p:cNvPr id="80" name="Google Shape;80;g29d7589ea21_0_14:notes"/>
+          <p:cNvPr id="80" name="Google Shape;80;g29345860dc9_1_180:notes"/>
           <p:cNvSpPr/>
           <p:nvPr>
             <p:ph idx="2" type="sldImg"/>
@@ -1155,7 +1155,7 @@
       </p:sp>
       <p:sp>
         <p:nvSpPr>
-          <p:cNvPr id="81" name="Google Shape;81;g29d7589ea21_0_14:notes"/>
+          <p:cNvPr id="81" name="Google Shape;81;g29345860dc9_1_180:notes"/>
           <p:cNvSpPr txBox="1"/>
           <p:nvPr>
             <p:ph idx="1" type="body"/>
@@ -1403,7 +1403,7 @@
   <p:cSld>
     <p:spTree>
       <p:nvGrpSpPr>
-        <p:cNvPr id="97" name="Shape 97"/>
+        <p:cNvPr id="98" name="Shape 98"/>
         <p:cNvGrpSpPr/>
         <p:nvPr/>
       </p:nvGrpSpPr>
@@ -1417,7 +1417,7 @@
       </p:grpSpPr>
       <p:sp>
         <p:nvSpPr>
-          <p:cNvPr id="98" name="Google Shape;98;g29d7589ea21_0_1:notes"/>
+          <p:cNvPr id="99" name="Google Shape;99;g29d7589ea21_0_1:notes"/>
           <p:cNvSpPr/>
           <p:nvPr>
             <p:ph idx="2" type="sldImg"/>
@@ -1452,7 +1452,7 @@
       </p:sp>
       <p:sp>
         <p:nvSpPr>
-          <p:cNvPr id="99" name="Google Shape;99;g29d7589ea21_0_1:notes"/>
+          <p:cNvPr id="100" name="Google Shape;100;g29d7589ea21_0_1:notes"/>
           <p:cNvSpPr txBox="1"/>
           <p:nvPr>
             <p:ph idx="1" type="body"/>
@@ -1502,7 +1502,7 @@
   <p:cSld>
     <p:spTree>
       <p:nvGrpSpPr>
-        <p:cNvPr id="103" name="Shape 103"/>
+        <p:cNvPr id="104" name="Shape 104"/>
         <p:cNvGrpSpPr/>
         <p:nvPr/>
       </p:nvGrpSpPr>
@@ -1516,7 +1516,7 @@
       </p:grpSpPr>
       <p:sp>
         <p:nvSpPr>
-          <p:cNvPr id="104" name="Google Shape;104;g29d7589ea21_0_7:notes"/>
+          <p:cNvPr id="105" name="Google Shape;105;g29d7589ea21_0_7:notes"/>
           <p:cNvSpPr/>
           <p:nvPr>
             <p:ph idx="2" type="sldImg"/>
@@ -1551,7 +1551,7 @@
       </p:sp>
       <p:sp>
         <p:nvSpPr>
-          <p:cNvPr id="105" name="Google Shape;105;g29d7589ea21_0_7:notes"/>
+          <p:cNvPr id="106" name="Google Shape;106;g29d7589ea21_0_7:notes"/>
           <p:cNvSpPr txBox="1"/>
           <p:nvPr>
             <p:ph idx="1" type="body"/>
@@ -7049,7 +7049,7 @@
             </a:pPr>
             <a:r>
               <a:rPr lang="en"/>
-              <a:t>Intorduction</a:t>
+              <a:t>Motivation/Purpose/Aims/Hypothesis</a:t>
             </a:r>
             <a:endParaRPr/>
           </a:p>
@@ -7090,7 +7090,7 @@
             </a:pPr>
             <a:r>
               <a:rPr lang="en"/>
-              <a:t>Achieved result in NLP and image Processing </a:t>
+              <a:t>Explore the use of CNN in NLP</a:t>
             </a:r>
             <a:endParaRPr/>
           </a:p>
@@ -7107,7 +7107,7 @@
             </a:pPr>
             <a:r>
               <a:rPr lang="en"/>
-              <a:t>Proposed single CNN model</a:t>
+              <a:t>Aims to demonstrate that simple CNN can have better result</a:t>
             </a:r>
             <a:endParaRPr/>
           </a:p>
@@ -7124,11 +7124,7 @@
             </a:pPr>
             <a:r>
               <a:rPr lang="en"/>
-              <a:t>T</a:t>
-            </a:r>
-            <a:r>
-              <a:rPr lang="en"/>
-              <a:t>rained on 100 billion words</a:t>
+              <a:t>Potential gains in performance by fine-tuning and pre trained vectors</a:t>
             </a:r>
             <a:endParaRPr/>
           </a:p>
@@ -7145,15 +7141,22 @@
             </a:pPr>
             <a:r>
               <a:rPr lang="en"/>
-              <a:t>Excellent result in multiple </a:t>
+              <a:t>Motivated by the need of effectiveness and efficient models</a:t>
             </a:r>
+            <a:endParaRPr/>
+          </a:p>
+          <a:p>
+            <a:pPr indent="0" lvl="0" marL="457200" rtl="0" algn="l">
+              <a:spcBef>
+                <a:spcPts val="1200"/>
+              </a:spcBef>
+              <a:spcAft>
+                <a:spcPts val="0"/>
+              </a:spcAft>
+              <a:buNone/>
+            </a:pPr>
             <a:r>
-              <a:rPr lang="en"/>
-              <a:t>benchmark</a:t>
-            </a:r>
-            <a:r>
-              <a:rPr lang="en"/>
-              <a:t> </a:t>
+              <a:t/>
             </a:r>
             <a:endParaRPr/>
           </a:p>
@@ -7233,7 +7236,7 @@
             </a:pPr>
             <a:r>
               <a:rPr lang="en"/>
-              <a:t>Dataset</a:t>
+              <a:t>Contribution</a:t>
             </a:r>
             <a:endParaRPr/>
           </a:p>
@@ -7274,7 +7277,11 @@
             </a:pPr>
             <a:r>
               <a:rPr lang="en"/>
-              <a:t>Movie Reviews datasets</a:t>
+              <a:t>Proposes modification to the CNN </a:t>
+            </a:r>
+            <a:r>
+              <a:rPr lang="en"/>
+              <a:t>architecture</a:t>
             </a:r>
             <a:endParaRPr/>
           </a:p>
@@ -7291,7 +7298,7 @@
             </a:pPr>
             <a:r>
               <a:rPr lang="en"/>
-              <a:t>Stanford Sentiment Treebank(SST-1)</a:t>
+              <a:t>With minimum hyperparameter, this paper still had excellent results</a:t>
             </a:r>
             <a:endParaRPr/>
           </a:p>
@@ -7308,7 +7315,7 @@
             </a:pPr>
             <a:r>
               <a:rPr lang="en"/>
-              <a:t>Subjectivity dataset(Subj)</a:t>
+              <a:t>With compare to other model it performed remarkably</a:t>
             </a:r>
             <a:endParaRPr/>
           </a:p>
@@ -7325,41 +7332,7 @@
             </a:pPr>
             <a:r>
               <a:rPr lang="en"/>
-              <a:t>TREC question datasets</a:t>
-            </a:r>
-            <a:endParaRPr/>
-          </a:p>
-          <a:p>
-            <a:pPr indent="-342900" lvl="0" marL="457200" rtl="0" algn="l">
-              <a:spcBef>
-                <a:spcPts val="0"/>
-              </a:spcBef>
-              <a:spcAft>
-                <a:spcPts val="0"/>
-              </a:spcAft>
-              <a:buSzPts val="1800"/>
-              <a:buChar char="●"/>
-            </a:pPr>
-            <a:r>
-              <a:rPr lang="en"/>
-              <a:t>Customer reviews datasets</a:t>
-            </a:r>
-            <a:endParaRPr/>
-          </a:p>
-          <a:p>
-            <a:pPr indent="-342900" lvl="0" marL="457200" rtl="0" algn="l">
-              <a:spcBef>
-                <a:spcPts val="0"/>
-              </a:spcBef>
-              <a:spcAft>
-                <a:spcPts val="0"/>
-              </a:spcAft>
-              <a:buSzPts val="1800"/>
-              <a:buChar char="●"/>
-            </a:pPr>
-            <a:r>
-              <a:rPr lang="en"/>
-              <a:t>MPQA datasets</a:t>
+              <a:t>Showcasing the effectiveness of CNN model</a:t>
             </a:r>
             <a:endParaRPr/>
           </a:p>
@@ -7424,11 +7397,7 @@
             </a:pPr>
             <a:r>
               <a:rPr lang="en"/>
-              <a:t>Methodology</a:t>
-            </a:r>
-            <a:r>
-              <a:rPr lang="en"/>
-              <a:t> </a:t>
+              <a:t>Dataset</a:t>
             </a:r>
             <a:endParaRPr/>
           </a:p>
@@ -7444,7 +7413,7 @@
         </p:nvSpPr>
         <p:spPr>
           <a:xfrm>
-            <a:off x="277825" y="1158125"/>
+            <a:off x="311700" y="1152475"/>
             <a:ext cx="8520600" cy="3416400"/>
           </a:xfrm>
           <a:prstGeom prst="rect">
@@ -7469,7 +7438,7 @@
             </a:pPr>
             <a:r>
               <a:rPr lang="en"/>
-              <a:t>One Layer CNN model</a:t>
+              <a:t>Movie Reviews datasets</a:t>
             </a:r>
             <a:endParaRPr/>
           </a:p>
@@ -7486,7 +7455,7 @@
             </a:pPr>
             <a:r>
               <a:rPr lang="en"/>
-              <a:t>Pre-trained word vector from word2vec</a:t>
+              <a:t>Stanford Sentiment Treebank(SST-1)</a:t>
             </a:r>
             <a:endParaRPr/>
           </a:p>
@@ -7503,7 +7472,7 @@
             </a:pPr>
             <a:r>
               <a:rPr lang="en"/>
-              <a:t>Three variants of model</a:t>
+              <a:t>Subjectivity dataset(Subj)</a:t>
             </a:r>
             <a:endParaRPr/>
           </a:p>
@@ -7520,15 +7489,7 @@
             </a:pPr>
             <a:r>
               <a:rPr lang="en"/>
-              <a:t>Model architecture allows the use of both pre-trained and task-specific </a:t>
-            </a:r>
-            <a:r>
-              <a:rPr lang="en"/>
-              <a:t>vector</a:t>
-            </a:r>
-            <a:r>
-              <a:rPr lang="en"/>
-              <a:t>.</a:t>
+              <a:t>TREC question datasets</a:t>
             </a:r>
             <a:endParaRPr/>
           </a:p>
@@ -7545,34 +7506,24 @@
             </a:pPr>
             <a:r>
               <a:rPr lang="en"/>
-              <a:t>Model </a:t>
-            </a:r>
-            <a:r>
-              <a:rPr lang="en"/>
-              <a:t>achieve</a:t>
-            </a:r>
-            <a:r>
-              <a:rPr lang="en"/>
-              <a:t> excellent result on multiple </a:t>
-            </a:r>
-            <a:r>
-              <a:rPr lang="en"/>
-              <a:t>benchmark</a:t>
+              <a:t>Customer reviews datasets</a:t>
             </a:r>
             <a:endParaRPr/>
           </a:p>
           <a:p>
-            <a:pPr indent="0" lvl="0" marL="457200" rtl="0" algn="l">
-              <a:spcBef>
-                <a:spcPts val="1200"/>
-              </a:spcBef>
-              <a:spcAft>
-                <a:spcPts val="1200"/>
-              </a:spcAft>
-              <a:buNone/>
+            <a:pPr indent="-342900" lvl="0" marL="457200" rtl="0" algn="l">
+              <a:spcBef>
+                <a:spcPts val="0"/>
+              </a:spcBef>
+              <a:spcAft>
+                <a:spcPts val="0"/>
+              </a:spcAft>
+              <a:buSzPts val="1800"/>
+              <a:buChar char="●"/>
             </a:pPr>
             <a:r>
-              <a:t/>
+              <a:rPr lang="en"/>
+              <a:t>MPQA datasets</a:t>
             </a:r>
             <a:endParaRPr/>
           </a:p>
@@ -7637,7 +7588,11 @@
             </a:pPr>
             <a:r>
               <a:rPr lang="en"/>
-              <a:t>Hyperparameters</a:t>
+              <a:t>Methodology</a:t>
+            </a:r>
+            <a:r>
+              <a:rPr lang="en"/>
+              <a:t> </a:t>
             </a:r>
             <a:endParaRPr/>
           </a:p>
@@ -7653,7 +7608,7 @@
         </p:nvSpPr>
         <p:spPr>
           <a:xfrm>
-            <a:off x="311700" y="1152475"/>
+            <a:off x="277825" y="1158125"/>
             <a:ext cx="8520600" cy="3416400"/>
           </a:xfrm>
           <a:prstGeom prst="rect">
@@ -7678,15 +7633,7 @@
             </a:pPr>
             <a:r>
               <a:rPr lang="en"/>
-              <a:t>Hyperparameters used in </a:t>
-            </a:r>
-            <a:r>
-              <a:rPr lang="en"/>
-              <a:t>experiments</a:t>
-            </a:r>
-            <a:r>
-              <a:rPr lang="en"/>
-              <a:t> are RLU, filter size of 3,4 and 5 with 100 feature maps each, dropout rate of 0.5, l2 constraint of 3 and mini batch of 50</a:t>
+              <a:t>One Layer CNN model</a:t>
             </a:r>
             <a:endParaRPr/>
           </a:p>
@@ -7703,7 +7650,7 @@
             </a:pPr>
             <a:r>
               <a:rPr lang="en"/>
-              <a:t>There were chosen through grid search on SST-2 dev set</a:t>
+              <a:t>Pre-trained word vector from word2vec</a:t>
             </a:r>
             <a:endParaRPr/>
           </a:p>
@@ -7720,19 +7667,61 @@
             </a:pPr>
             <a:r>
               <a:rPr lang="en"/>
-              <a:t>Training process involves in stochastic gradient decent over shuffled mini </a:t>
+              <a:t>Three variants of model</a:t>
+            </a:r>
+            <a:endParaRPr/>
+          </a:p>
+          <a:p>
+            <a:pPr indent="-342900" lvl="0" marL="457200" rtl="0" algn="l">
+              <a:spcBef>
+                <a:spcPts val="0"/>
+              </a:spcBef>
+              <a:spcAft>
+                <a:spcPts val="0"/>
+              </a:spcAft>
+              <a:buSzPts val="1800"/>
+              <a:buChar char="●"/>
+            </a:pPr>
+            <a:r>
+              <a:rPr lang="en"/>
+              <a:t>Model architecture allows the use of both pre-trained and task-specific </a:t>
             </a:r>
             <a:r>
               <a:rPr lang="en"/>
-              <a:t>batches</a:t>
+              <a:t>vector</a:t>
             </a:r>
             <a:r>
               <a:rPr lang="en"/>
-              <a:t> with </a:t>
+              <a:t>.</a:t>
+            </a:r>
+            <a:endParaRPr/>
+          </a:p>
+          <a:p>
+            <a:pPr indent="-342900" lvl="0" marL="457200" rtl="0" algn="l">
+              <a:spcBef>
+                <a:spcPts val="0"/>
+              </a:spcBef>
+              <a:spcAft>
+                <a:spcPts val="0"/>
+              </a:spcAft>
+              <a:buSzPts val="1800"/>
+              <a:buChar char="●"/>
+            </a:pPr>
+            <a:r>
+              <a:rPr lang="en"/>
+              <a:t>Model </a:t>
             </a:r>
             <a:r>
               <a:rPr lang="en"/>
-              <a:t>Adadelta update rule.</a:t>
+              <a:t>achieve</a:t>
+            </a:r>
+            <a:r>
+              <a:rPr lang="en"/>
+              <a:t> excellent result on multiple </a:t>
+            </a:r>
+            <a:r>
+              <a:rPr lang="en"/>
+              <a:t>benchmark</a:t>
             </a:r>
             <a:endParaRPr/>
           </a:p>
@@ -7812,7 +7801,7 @@
             </a:pPr>
             <a:r>
               <a:rPr lang="en"/>
-              <a:t>Results</a:t>
+              <a:t>Results and Conclusion</a:t>
             </a:r>
             <a:endParaRPr/>
           </a:p>
@@ -7921,8 +7910,8 @@
         </p:nvSpPr>
         <p:spPr>
           <a:xfrm>
-            <a:off x="311700" y="1152475"/>
-            <a:ext cx="8520600" cy="3416400"/>
+            <a:off x="311700" y="1429300"/>
+            <a:ext cx="3999900" cy="3139500"/>
           </a:xfrm>
           <a:prstGeom prst="rect">
             <a:avLst/>
@@ -7934,93 +7923,122 @@
           </a:bodyPr>
           <a:lstStyle/>
           <a:p>
-            <a:pPr indent="-342900" lvl="0" marL="457200" rtl="0" algn="l">
-              <a:spcBef>
-                <a:spcPts val="0"/>
-              </a:spcBef>
-              <a:spcAft>
-                <a:spcPts val="0"/>
-              </a:spcAft>
-              <a:buSzPts val="1800"/>
-              <a:buChar char="●"/>
+            <a:pPr indent="0" lvl="0" marL="457200" rtl="0" algn="l">
+              <a:spcBef>
+                <a:spcPts val="0"/>
+              </a:spcBef>
+              <a:spcAft>
+                <a:spcPts val="0"/>
+              </a:spcAft>
+              <a:buNone/>
             </a:pPr>
             <a:r>
-              <a:rPr lang="en"/>
-              <a:t>Does not provide detailed </a:t>
+              <a:rPr lang="en" sz="1700"/>
+              <a:t>Limitation I</a:t>
             </a:r>
+            <a:endParaRPr sz="1700"/>
+          </a:p>
+          <a:p>
+            <a:pPr indent="0" lvl="0" marL="457200" rtl="0" algn="l">
+              <a:spcBef>
+                <a:spcPts val="1200"/>
+              </a:spcBef>
+              <a:spcAft>
+                <a:spcPts val="0"/>
+              </a:spcAft>
+              <a:buNone/>
+            </a:pPr>
             <a:r>
-              <a:rPr lang="en"/>
-              <a:t>information on specific results.</a:t>
+              <a:rPr lang="en" sz="1200"/>
+              <a:t>First limitation is the lack of extensive hyperparameter tuning. It was mentioned in the paper that the models were giving excellent result on fewer hyperparameter tuning. Which may raise a question about the robustness and generalizability of the models.</a:t>
+            </a:r>
+            <a:endParaRPr sz="1200"/>
+          </a:p>
+          <a:p>
+            <a:pPr indent="0" lvl="0" marL="914400" rtl="0" algn="l">
+              <a:spcBef>
+                <a:spcPts val="1200"/>
+              </a:spcBef>
+              <a:spcAft>
+                <a:spcPts val="0"/>
+              </a:spcAft>
+              <a:buNone/>
+            </a:pPr>
+            <a:r>
+              <a:t/>
             </a:r>
             <a:endParaRPr/>
           </a:p>
           <a:p>
-            <a:pPr indent="-342900" lvl="0" marL="457200" rtl="0" algn="l">
-              <a:spcBef>
-                <a:spcPts val="0"/>
-              </a:spcBef>
-              <a:spcAft>
-                <a:spcPts val="0"/>
-              </a:spcAft>
-              <a:buSzPts val="1800"/>
-              <a:buChar char="●"/>
+            <a:pPr indent="0" lvl="0" marL="914400" rtl="0" algn="l">
+              <a:spcBef>
+                <a:spcPts val="1200"/>
+              </a:spcBef>
+              <a:spcAft>
+                <a:spcPts val="1200"/>
+              </a:spcAft>
+              <a:buNone/>
             </a:pPr>
             <a:r>
-              <a:rPr lang="en"/>
-              <a:t>Hyperparameter and word vectors were not discussed properly.</a:t>
+              <a:t/>
             </a:r>
             <a:endParaRPr/>
           </a:p>
+        </p:txBody>
+      </p:sp>
+      <p:sp>
+        <p:nvSpPr>
+          <p:cNvPr id="97" name="Google Shape;97;p19"/>
+          <p:cNvSpPr txBox="1"/>
+          <p:nvPr>
+            <p:ph idx="2" type="body"/>
+          </p:nvPr>
+        </p:nvSpPr>
+        <p:spPr>
+          <a:xfrm>
+            <a:off x="4832400" y="1429375"/>
+            <a:ext cx="3999900" cy="3139500"/>
+          </a:xfrm>
+          <a:prstGeom prst="rect">
+            <a:avLst/>
+          </a:prstGeom>
+        </p:spPr>
+        <p:txBody>
+          <a:bodyPr anchorCtr="0" anchor="t" bIns="91425" lIns="91425" spcFirstLastPara="1" rIns="91425" wrap="square" tIns="91425">
+            <a:normAutofit/>
+          </a:bodyPr>
+          <a:lstStyle/>
           <a:p>
-            <a:pPr indent="-342900" lvl="0" marL="457200" rtl="0" algn="l">
-              <a:spcBef>
-                <a:spcPts val="0"/>
-              </a:spcBef>
-              <a:spcAft>
-                <a:spcPts val="0"/>
-              </a:spcAft>
-              <a:buSzPts val="1800"/>
-              <a:buChar char="●"/>
+            <a:pPr indent="0" lvl="0" marL="0" rtl="0" algn="l">
+              <a:spcBef>
+                <a:spcPts val="0"/>
+              </a:spcBef>
+              <a:spcAft>
+                <a:spcPts val="0"/>
+              </a:spcAft>
+              <a:buNone/>
             </a:pPr>
             <a:r>
-              <a:rPr lang="en"/>
-              <a:t>Does not explore the reason behind superior performance of word2vec.</a:t>
+              <a:rPr lang="en" sz="1800"/>
+              <a:t>Limitation II</a:t>
             </a:r>
-            <a:endParaRPr/>
+            <a:endParaRPr sz="1800"/>
           </a:p>
           <a:p>
-            <a:pPr indent="-342900" lvl="0" marL="457200" rtl="0" algn="l">
-              <a:spcBef>
-                <a:spcPts val="0"/>
-              </a:spcBef>
-              <a:spcAft>
-                <a:spcPts val="0"/>
-              </a:spcAft>
-              <a:buSzPts val="1800"/>
-              <a:buChar char="●"/>
+            <a:pPr indent="0" lvl="0" marL="0" rtl="0" algn="l">
+              <a:spcBef>
+                <a:spcPts val="1200"/>
+              </a:spcBef>
+              <a:spcAft>
+                <a:spcPts val="1200"/>
+              </a:spcAft>
+              <a:buNone/>
             </a:pPr>
             <a:r>
-              <a:rPr lang="en"/>
-              <a:t>Limitation of the CNN architecture.</a:t>
+              <a:rPr lang="en" sz="1200"/>
+              <a:t>The comparison with other established models is limited. Albeit the study highlights advances on 4 out of 7 tasks above the state of the art, it does not offer a thorough comparison with other models that are already in use.</a:t>
             </a:r>
-            <a:endParaRPr/>
-          </a:p>
-          <a:p>
-            <a:pPr indent="-342900" lvl="0" marL="457200" rtl="0" algn="l">
-              <a:spcBef>
-                <a:spcPts val="0"/>
-              </a:spcBef>
-              <a:spcAft>
-                <a:spcPts val="0"/>
-              </a:spcAft>
-              <a:buSzPts val="1800"/>
-              <a:buChar char="●"/>
-            </a:pPr>
-            <a:r>
-              <a:rPr lang="en"/>
-              <a:t>Does not provide comprehensive analysis.</a:t>
-            </a:r>
-            <a:endParaRPr/>
+            <a:endParaRPr sz="1200"/>
           </a:p>
         </p:txBody>
       </p:sp>
@@ -8037,7 +8055,7 @@
   <p:cSld>
     <p:spTree>
       <p:nvGrpSpPr>
-        <p:cNvPr id="100" name="Shape 100"/>
+        <p:cNvPr id="101" name="Shape 101"/>
         <p:cNvGrpSpPr/>
         <p:nvPr/>
       </p:nvGrpSpPr>
@@ -8051,7 +8069,7 @@
       </p:grpSpPr>
       <p:sp>
         <p:nvSpPr>
-          <p:cNvPr id="101" name="Google Shape;101;p20"/>
+          <p:cNvPr id="102" name="Google Shape;102;p20"/>
           <p:cNvSpPr txBox="1"/>
           <p:nvPr>
             <p:ph type="title"/>
@@ -8083,7 +8101,7 @@
             </a:pPr>
             <a:r>
               <a:rPr lang="en"/>
-              <a:t>Future Scope</a:t>
+              <a:t>Synthesis</a:t>
             </a:r>
             <a:endParaRPr/>
           </a:p>
@@ -8091,7 +8109,7 @@
       </p:sp>
       <p:sp>
         <p:nvSpPr>
-          <p:cNvPr id="102" name="Google Shape;102;p20"/>
+          <p:cNvPr id="103" name="Google Shape;103;p20"/>
           <p:cNvSpPr txBox="1"/>
           <p:nvPr>
             <p:ph idx="1" type="body"/>
@@ -8206,7 +8224,7 @@
   <p:cSld>
     <p:spTree>
       <p:nvGrpSpPr>
-        <p:cNvPr id="106" name="Shape 106"/>
+        <p:cNvPr id="107" name="Shape 107"/>
         <p:cNvGrpSpPr/>
         <p:nvPr/>
       </p:nvGrpSpPr>
@@ -8220,7 +8238,7 @@
       </p:grpSpPr>
       <p:sp>
         <p:nvSpPr>
-          <p:cNvPr id="107" name="Google Shape;107;p21"/>
+          <p:cNvPr id="108" name="Google Shape;108;p21"/>
           <p:cNvSpPr txBox="1"/>
           <p:nvPr>
             <p:ph idx="1" type="body"/>

</xml_diff>